<commit_message>
Final poster update & presentation update after review
</commit_message>
<xml_diff>
--- a/papers/poster.pptx
+++ b/papers/poster.pptx
@@ -256,7 +256,7 @@
           <a:bodyPr lIns="0" rIns="0" tIns="0" bIns="0" anchor="b"/>
           <a:p>
             <a:pPr algn="r"/>
-            <a:fld id="{A1036C91-180A-4B30-B0AE-759A79DC1C4E}" type="slidenum">
+            <a:fld id="{A082CD96-04A0-4387-A27D-DDA711186EBD}" type="slidenum">
               <a:rPr b="0" lang="en-AU" sz="1400" spc="-1" strike="noStrike">
                 <a:solidFill>
                   <a:srgbClr val="000000"/>
@@ -320,7 +320,7 @@
         <p:spPr>
           <a:xfrm>
             <a:off x="679320" y="4776840"/>
-            <a:ext cx="5437800" cy="3907440"/>
+            <a:ext cx="5437440" cy="3907080"/>
           </a:xfrm>
           <a:prstGeom prst="rect">
             <a:avLst/>
@@ -352,7 +352,7 @@
         <p:spPr>
           <a:xfrm>
             <a:off x="3849840" y="9429840"/>
-            <a:ext cx="2945160" cy="495720"/>
+            <a:ext cx="2944800" cy="495360"/>
           </a:xfrm>
           <a:prstGeom prst="rect">
             <a:avLst/>
@@ -376,7 +376,7 @@
                 <a:spcPct val="100000"/>
               </a:lnSpc>
             </a:pPr>
-            <a:fld id="{16139206-4336-4EBF-8BDF-9E72BB3CBA9E}" type="slidenum">
+            <a:fld id="{BC6F7155-5B32-4594-ABEB-AEA63A33929A}" type="slidenum">
               <a:rPr b="0" lang="en-AU" sz="1200" spc="-1" strike="noStrike">
                 <a:solidFill>
                   <a:srgbClr val="000000"/>
@@ -461,8 +461,8 @@
         </p:nvSpPr>
         <p:spPr>
           <a:xfrm>
-            <a:off x="1668240" y="666360"/>
-            <a:ext cx="32388480" cy="2376360"/>
+            <a:off x="2139840" y="1207800"/>
+            <a:ext cx="38522880" cy="5055480"/>
           </a:xfrm>
           <a:prstGeom prst="rect">
             <a:avLst/>
@@ -499,7 +499,7 @@
         <p:spPr>
           <a:xfrm>
             <a:off x="2139840" y="7084080"/>
-            <a:ext cx="38522520" cy="8375400"/>
+            <a:ext cx="38522880" cy="8375400"/>
           </a:xfrm>
           <a:prstGeom prst="rect">
             <a:avLst/>
@@ -535,7 +535,7 @@
         <p:spPr>
           <a:xfrm>
             <a:off x="2139840" y="16255440"/>
-            <a:ext cx="38522520" cy="8375400"/>
+            <a:ext cx="38522880" cy="8375400"/>
           </a:xfrm>
           <a:prstGeom prst="rect">
             <a:avLst/>
@@ -592,8 +592,8 @@
         </p:nvSpPr>
         <p:spPr>
           <a:xfrm>
-            <a:off x="1668240" y="666360"/>
-            <a:ext cx="32388480" cy="2376360"/>
+            <a:off x="2139840" y="1207800"/>
+            <a:ext cx="38522880" cy="5055480"/>
           </a:xfrm>
           <a:prstGeom prst="rect">
             <a:avLst/>
@@ -795,8 +795,8 @@
         </p:nvSpPr>
         <p:spPr>
           <a:xfrm>
-            <a:off x="1668240" y="666360"/>
-            <a:ext cx="32388480" cy="2376360"/>
+            <a:off x="2139840" y="1207800"/>
+            <a:ext cx="38522880" cy="5055480"/>
           </a:xfrm>
           <a:prstGeom prst="rect">
             <a:avLst/>
@@ -1070,8 +1070,8 @@
         </p:nvSpPr>
         <p:spPr>
           <a:xfrm>
-            <a:off x="1668240" y="666360"/>
-            <a:ext cx="32388480" cy="2376360"/>
+            <a:off x="2139840" y="1207800"/>
+            <a:ext cx="38522880" cy="5055480"/>
           </a:xfrm>
           <a:prstGeom prst="rect">
             <a:avLst/>
@@ -1108,7 +1108,7 @@
         <p:spPr>
           <a:xfrm>
             <a:off x="2139840" y="7084080"/>
-            <a:ext cx="38522520" cy="17558640"/>
+            <a:ext cx="38522880" cy="17559000"/>
           </a:xfrm>
           <a:prstGeom prst="rect">
             <a:avLst/>
@@ -1166,8 +1166,8 @@
         </p:nvSpPr>
         <p:spPr>
           <a:xfrm>
-            <a:off x="1668240" y="666360"/>
-            <a:ext cx="32388480" cy="2376360"/>
+            <a:off x="2139840" y="1207800"/>
+            <a:ext cx="38522880" cy="5055480"/>
           </a:xfrm>
           <a:prstGeom prst="rect">
             <a:avLst/>
@@ -1204,7 +1204,7 @@
         <p:spPr>
           <a:xfrm>
             <a:off x="2139840" y="7084080"/>
-            <a:ext cx="38522520" cy="17558640"/>
+            <a:ext cx="38522880" cy="17559000"/>
           </a:xfrm>
           <a:prstGeom prst="rect">
             <a:avLst/>
@@ -1261,8 +1261,8 @@
         </p:nvSpPr>
         <p:spPr>
           <a:xfrm>
-            <a:off x="1668240" y="666360"/>
-            <a:ext cx="32388480" cy="2376360"/>
+            <a:off x="2139840" y="1207800"/>
+            <a:ext cx="38522880" cy="5055480"/>
           </a:xfrm>
           <a:prstGeom prst="rect">
             <a:avLst/>
@@ -1299,7 +1299,7 @@
         <p:spPr>
           <a:xfrm>
             <a:off x="2139840" y="7084080"/>
-            <a:ext cx="18798840" cy="17558640"/>
+            <a:ext cx="18798840" cy="17559000"/>
           </a:xfrm>
           <a:prstGeom prst="rect">
             <a:avLst/>
@@ -1335,7 +1335,7 @@
         <p:spPr>
           <a:xfrm>
             <a:off x="21879000" y="7084080"/>
-            <a:ext cx="18798840" cy="17558640"/>
+            <a:ext cx="18798840" cy="17559000"/>
           </a:xfrm>
           <a:prstGeom prst="rect">
             <a:avLst/>
@@ -1392,8 +1392,8 @@
         </p:nvSpPr>
         <p:spPr>
           <a:xfrm>
-            <a:off x="1668240" y="666360"/>
-            <a:ext cx="32388480" cy="2376360"/>
+            <a:off x="2139840" y="1207800"/>
+            <a:ext cx="38522880" cy="5055480"/>
           </a:xfrm>
           <a:prstGeom prst="rect">
             <a:avLst/>
@@ -1451,8 +1451,8 @@
         </p:nvSpPr>
         <p:spPr>
           <a:xfrm>
-            <a:off x="1668240" y="666360"/>
-            <a:ext cx="32388480" cy="11016720"/>
+            <a:off x="2139840" y="1207800"/>
+            <a:ext cx="38522880" cy="23435640"/>
           </a:xfrm>
           <a:prstGeom prst="rect">
             <a:avLst/>
@@ -1510,8 +1510,8 @@
         </p:nvSpPr>
         <p:spPr>
           <a:xfrm>
-            <a:off x="1668240" y="666360"/>
-            <a:ext cx="32388480" cy="2376360"/>
+            <a:off x="2139840" y="1207800"/>
+            <a:ext cx="38522880" cy="5055480"/>
           </a:xfrm>
           <a:prstGeom prst="rect">
             <a:avLst/>
@@ -1620,7 +1620,7 @@
         <p:spPr>
           <a:xfrm>
             <a:off x="21879000" y="7084080"/>
-            <a:ext cx="18798840" cy="17558640"/>
+            <a:ext cx="18798840" cy="17559000"/>
           </a:xfrm>
           <a:prstGeom prst="rect">
             <a:avLst/>
@@ -1677,8 +1677,8 @@
         </p:nvSpPr>
         <p:spPr>
           <a:xfrm>
-            <a:off x="1668240" y="666360"/>
-            <a:ext cx="32388480" cy="2376360"/>
+            <a:off x="2139840" y="1207800"/>
+            <a:ext cx="38522880" cy="5055480"/>
           </a:xfrm>
           <a:prstGeom prst="rect">
             <a:avLst/>
@@ -1715,7 +1715,7 @@
         <p:spPr>
           <a:xfrm>
             <a:off x="2139840" y="7084080"/>
-            <a:ext cx="18798840" cy="17558640"/>
+            <a:ext cx="18798840" cy="17559000"/>
           </a:xfrm>
           <a:prstGeom prst="rect">
             <a:avLst/>
@@ -1844,8 +1844,8 @@
         </p:nvSpPr>
         <p:spPr>
           <a:xfrm>
-            <a:off x="1668240" y="666360"/>
-            <a:ext cx="32388480" cy="2376360"/>
+            <a:off x="2139840" y="1207800"/>
+            <a:ext cx="38522880" cy="5055480"/>
           </a:xfrm>
           <a:prstGeom prst="rect">
             <a:avLst/>
@@ -1954,7 +1954,7 @@
         <p:spPr>
           <a:xfrm>
             <a:off x="2139840" y="16255440"/>
-            <a:ext cx="38522520" cy="8375400"/>
+            <a:ext cx="38522880" cy="8375400"/>
           </a:xfrm>
           <a:prstGeom prst="rect">
             <a:avLst/>
@@ -2008,7 +2008,7 @@
         <p:spPr>
           <a:xfrm>
             <a:off x="-23400" y="0"/>
-            <a:ext cx="30538440" cy="9110520"/>
+            <a:ext cx="30538080" cy="9110160"/>
           </a:xfrm>
           <a:prstGeom prst="rect">
             <a:avLst/>
@@ -2034,7 +2034,7 @@
         <p:spPr>
           <a:xfrm>
             <a:off x="-248040" y="16361280"/>
-            <a:ext cx="42937200" cy="4705200"/>
+            <a:ext cx="42936840" cy="4704840"/>
           </a:xfrm>
           <a:prstGeom prst="rect">
             <a:avLst/>
@@ -2063,8 +2063,8 @@
         </p:nvSpPr>
         <p:spPr>
           <a:xfrm>
-            <a:off x="1668240" y="666360"/>
-            <a:ext cx="32388480" cy="2376360"/>
+            <a:off x="2139840" y="1207800"/>
+            <a:ext cx="38522880" cy="5055480"/>
           </a:xfrm>
           <a:prstGeom prst="rect">
             <a:avLst/>
@@ -2073,8 +2073,9 @@
         <p:txBody>
           <a:bodyPr lIns="0" rIns="0" tIns="0" bIns="0" anchor="ctr"/>
           <a:p>
-            <a:r>
-              <a:rPr b="0" lang="en-AU" sz="1800" spc="-1" strike="noStrike">
+            <a:pPr algn="ctr"/>
+            <a:r>
+              <a:rPr b="0" lang="en-AU" sz="4400" spc="-1" strike="noStrike">
                 <a:solidFill>
                   <a:srgbClr val="000000"/>
                 </a:solidFill>
@@ -2087,7 +2088,7 @@
               </a:rPr>
               <a:t>Click to edit the title text format</a:t>
             </a:r>
-            <a:endParaRPr b="0" lang="en-AU" sz="1800" spc="-1" strike="noStrike">
+            <a:endParaRPr b="0" lang="en-AU" sz="4400" spc="-1" strike="noStrike">
               <a:solidFill>
                 <a:srgbClr val="000000"/>
               </a:solidFill>
@@ -2114,7 +2115,7 @@
         <p:spPr>
           <a:xfrm>
             <a:off x="2139840" y="7084080"/>
-            <a:ext cx="38522520" cy="17558640"/>
+            <a:ext cx="38522880" cy="17559000"/>
           </a:xfrm>
           <a:prstGeom prst="rect">
             <a:avLst/>
@@ -2132,7 +2133,7 @@
               <a:buChar char=""/>
             </a:pPr>
             <a:r>
-              <a:rPr b="0" lang="en-AU" sz="1800" spc="-1" strike="noStrike">
+              <a:rPr b="0" lang="en-AU" sz="3200" spc="-1" strike="noStrike">
                 <a:solidFill>
                   <a:srgbClr val="000000"/>
                 </a:solidFill>
@@ -2145,7 +2146,7 @@
               </a:rPr>
               <a:t>Click to edit the outline text format</a:t>
             </a:r>
-            <a:endParaRPr b="0" lang="en-AU" sz="1800" spc="-1" strike="noStrike">
+            <a:endParaRPr b="0" lang="en-AU" sz="3200" spc="-1" strike="noStrike">
               <a:solidFill>
                 <a:srgbClr val="000000"/>
               </a:solidFill>
@@ -2167,7 +2168,7 @@
               <a:buChar char=""/>
             </a:pPr>
             <a:r>
-              <a:rPr b="0" lang="en-AU" sz="1800" spc="-1" strike="noStrike">
+              <a:rPr b="0" lang="en-AU" sz="2800" spc="-1" strike="noStrike">
                 <a:solidFill>
                   <a:srgbClr val="000000"/>
                 </a:solidFill>
@@ -2180,7 +2181,7 @@
               </a:rPr>
               <a:t>Second Outline Level</a:t>
             </a:r>
-            <a:endParaRPr b="0" lang="en-AU" sz="1800" spc="-1" strike="noStrike">
+            <a:endParaRPr b="0" lang="en-AU" sz="2800" spc="-1" strike="noStrike">
               <a:solidFill>
                 <a:srgbClr val="000000"/>
               </a:solidFill>
@@ -2202,7 +2203,7 @@
               <a:buChar char=""/>
             </a:pPr>
             <a:r>
-              <a:rPr b="0" lang="en-AU" sz="1800" spc="-1" strike="noStrike">
+              <a:rPr b="0" lang="en-AU" sz="2400" spc="-1" strike="noStrike">
                 <a:solidFill>
                   <a:srgbClr val="000000"/>
                 </a:solidFill>
@@ -2215,7 +2216,7 @@
               </a:rPr>
               <a:t>Third Outline Level</a:t>
             </a:r>
-            <a:endParaRPr b="0" lang="en-AU" sz="1800" spc="-1" strike="noStrike">
+            <a:endParaRPr b="0" lang="en-AU" sz="2400" spc="-1" strike="noStrike">
               <a:solidFill>
                 <a:srgbClr val="000000"/>
               </a:solidFill>
@@ -2237,7 +2238,7 @@
               <a:buChar char=""/>
             </a:pPr>
             <a:r>
-              <a:rPr b="0" lang="en-AU" sz="1800" spc="-1" strike="noStrike">
+              <a:rPr b="0" lang="en-AU" sz="2000" spc="-1" strike="noStrike">
                 <a:solidFill>
                   <a:srgbClr val="000000"/>
                 </a:solidFill>
@@ -2250,7 +2251,7 @@
               </a:rPr>
               <a:t>Fourth Outline Level</a:t>
             </a:r>
-            <a:endParaRPr b="0" lang="en-AU" sz="1800" spc="-1" strike="noStrike">
+            <a:endParaRPr b="0" lang="en-AU" sz="2000" spc="-1" strike="noStrike">
               <a:solidFill>
                 <a:srgbClr val="000000"/>
               </a:solidFill>
@@ -2272,7 +2273,7 @@
               <a:buChar char=""/>
             </a:pPr>
             <a:r>
-              <a:rPr b="0" lang="en-AU" sz="1800" spc="-1" strike="noStrike">
+              <a:rPr b="0" lang="en-AU" sz="2000" spc="-1" strike="noStrike">
                 <a:solidFill>
                   <a:srgbClr val="000000"/>
                 </a:solidFill>
@@ -2285,7 +2286,7 @@
               </a:rPr>
               <a:t>Fifth Outline Level</a:t>
             </a:r>
-            <a:endParaRPr b="0" lang="en-AU" sz="1800" spc="-1" strike="noStrike">
+            <a:endParaRPr b="0" lang="en-AU" sz="2000" spc="-1" strike="noStrike">
               <a:solidFill>
                 <a:srgbClr val="000000"/>
               </a:solidFill>
@@ -2307,7 +2308,7 @@
               <a:buChar char=""/>
             </a:pPr>
             <a:r>
-              <a:rPr b="0" lang="en-AU" sz="1800" spc="-1" strike="noStrike">
+              <a:rPr b="0" lang="en-AU" sz="2000" spc="-1" strike="noStrike">
                 <a:solidFill>
                   <a:srgbClr val="000000"/>
                 </a:solidFill>
@@ -2320,7 +2321,7 @@
               </a:rPr>
               <a:t>Sixth Outline Level</a:t>
             </a:r>
-            <a:endParaRPr b="0" lang="en-AU" sz="1800" spc="-1" strike="noStrike">
+            <a:endParaRPr b="0" lang="en-AU" sz="2000" spc="-1" strike="noStrike">
               <a:solidFill>
                 <a:srgbClr val="000000"/>
               </a:solidFill>
@@ -2342,7 +2343,7 @@
               <a:buChar char=""/>
             </a:pPr>
             <a:r>
-              <a:rPr b="0" lang="en-AU" sz="1800" spc="-1" strike="noStrike">
+              <a:rPr b="0" lang="en-AU" sz="2000" spc="-1" strike="noStrike">
                 <a:solidFill>
                   <a:srgbClr val="000000"/>
                 </a:solidFill>
@@ -2355,7 +2356,7 @@
               </a:rPr>
               <a:t>Seventh Outline Level</a:t>
             </a:r>
-            <a:endParaRPr b="0" lang="en-AU" sz="1800" spc="-1" strike="noStrike">
+            <a:endParaRPr b="0" lang="en-AU" sz="2000" spc="-1" strike="noStrike">
               <a:solidFill>
                 <a:srgbClr val="000000"/>
               </a:solidFill>
@@ -2415,7 +2416,7 @@
         <p:spPr>
           <a:xfrm>
             <a:off x="43662600" y="8073000"/>
-            <a:ext cx="6016680" cy="4022280"/>
+            <a:ext cx="6016320" cy="4021920"/>
           </a:xfrm>
           <a:prstGeom prst="rect">
             <a:avLst/>
@@ -2497,7 +2498,7 @@
         <p:spPr>
           <a:xfrm>
             <a:off x="43777080" y="3518280"/>
-            <a:ext cx="6016680" cy="3585240"/>
+            <a:ext cx="6016320" cy="3584880"/>
           </a:xfrm>
           <a:prstGeom prst="rect">
             <a:avLst/>
@@ -2579,7 +2580,7 @@
         <p:spPr>
           <a:xfrm>
             <a:off x="43777080" y="13266360"/>
-            <a:ext cx="5902200" cy="2711160"/>
+            <a:ext cx="5901840" cy="2710800"/>
           </a:xfrm>
           <a:prstGeom prst="rect">
             <a:avLst/>
@@ -2661,7 +2662,7 @@
         <p:spPr>
           <a:xfrm>
             <a:off x="43777080" y="24145920"/>
-            <a:ext cx="5902200" cy="963000"/>
+            <a:ext cx="5901840" cy="962640"/>
           </a:xfrm>
           <a:prstGeom prst="rect">
             <a:avLst/>
@@ -2743,7 +2744,7 @@
         <p:spPr>
           <a:xfrm>
             <a:off x="43777080" y="25260840"/>
-            <a:ext cx="5902200" cy="2274120"/>
+            <a:ext cx="5901840" cy="2273760"/>
           </a:xfrm>
           <a:prstGeom prst="rect">
             <a:avLst/>
@@ -2825,7 +2826,7 @@
         <p:spPr>
           <a:xfrm>
             <a:off x="7129440" y="28663920"/>
-            <a:ext cx="12035880" cy="847800"/>
+            <a:ext cx="12035520" cy="847440"/>
           </a:xfrm>
           <a:prstGeom prst="rect">
             <a:avLst/>
@@ -2920,7 +2921,7 @@
         <p:spPr>
           <a:xfrm>
             <a:off x="1658160" y="1005480"/>
-            <a:ext cx="33810120" cy="1889640"/>
+            <a:ext cx="33809760" cy="1889280"/>
           </a:xfrm>
           <a:prstGeom prst="rect">
             <a:avLst/>
@@ -3010,7 +3011,7 @@
         <p:spPr>
           <a:xfrm>
             <a:off x="2504520" y="4624560"/>
-            <a:ext cx="32015520" cy="2066760"/>
+            <a:ext cx="32015160" cy="2066400"/>
           </a:xfrm>
           <a:prstGeom prst="rect">
             <a:avLst/>
@@ -3105,7 +3106,7 @@
         <p:spPr>
           <a:xfrm>
             <a:off x="1730160" y="3009960"/>
-            <a:ext cx="33810120" cy="1274760"/>
+            <a:ext cx="33809760" cy="1274400"/>
           </a:xfrm>
           <a:prstGeom prst="rect">
             <a:avLst/>
@@ -3190,7 +3191,22 @@
                 <a:latin typeface="Calibri"/>
                 <a:ea typeface="DejaVu Sans"/>
               </a:rPr>
-              <a:t>Steve Blackburn, Tony Hosking</a:t>
+              <a:t>Steve Blackburn, Tony Hosking,</a:t>
+            </a:r>
+            <a:r>
+              <a:rPr b="0" lang="en-AU" sz="3600" spc="-1" strike="noStrike">
+                <a:solidFill>
+                  <a:srgbClr val="000000"/>
+                </a:solidFill>
+                <a:uFill>
+                  <a:solidFill>
+                    <a:srgbClr val="ffffff"/>
+                  </a:solidFill>
+                </a:uFill>
+                <a:latin typeface="Calibri"/>
+                <a:ea typeface="DejaVu Sans"/>
+              </a:rPr>
+              <a:t> Michael Norrish, Shane Magrath</a:t>
             </a:r>
             <a:endParaRPr b="0" lang="en-AU" sz="1800" spc="-1" strike="noStrike">
               <a:solidFill>
@@ -3215,7 +3231,7 @@
         <p:spPr>
           <a:xfrm>
             <a:off x="1763280" y="28663920"/>
-            <a:ext cx="4512960" cy="594360"/>
+            <a:ext cx="4512600" cy="594000"/>
           </a:xfrm>
           <a:prstGeom prst="rect">
             <a:avLst/>
@@ -3314,7 +3330,7 @@
         <p:spPr>
           <a:xfrm>
             <a:off x="35299440" y="1744200"/>
-            <a:ext cx="5838120" cy="2000160"/>
+            <a:ext cx="5837760" cy="1999800"/>
           </a:xfrm>
           <a:prstGeom prst="rect">
             <a:avLst/>
@@ -3333,7 +3349,7 @@
         <p:spPr>
           <a:xfrm>
             <a:off x="1667880" y="7439400"/>
-            <a:ext cx="9488160" cy="5322960"/>
+            <a:ext cx="9487800" cy="5322600"/>
           </a:xfrm>
           <a:prstGeom prst="rect">
             <a:avLst/>
@@ -3428,7 +3444,7 @@
         <p:spPr>
           <a:xfrm>
             <a:off x="1747080" y="13285440"/>
-            <a:ext cx="10091520" cy="7014240"/>
+            <a:ext cx="10091160" cy="7013880"/>
           </a:xfrm>
           <a:prstGeom prst="rect">
             <a:avLst/>
@@ -3584,7 +3600,7 @@
         <p:spPr>
           <a:xfrm>
             <a:off x="1748880" y="20680560"/>
-            <a:ext cx="9948960" cy="6058080"/>
+            <a:ext cx="9948600" cy="6057720"/>
           </a:xfrm>
           <a:prstGeom prst="rect">
             <a:avLst/>
@@ -3712,7 +3728,7 @@
         <p:spPr>
           <a:xfrm>
             <a:off x="22718520" y="7128000"/>
-            <a:ext cx="18392760" cy="9680400"/>
+            <a:ext cx="15801480" cy="9680040"/>
           </a:xfrm>
           <a:prstGeom prst="rect">
             <a:avLst/>
@@ -3872,8 +3888,8 @@
         </p:nvSpPr>
         <p:spPr>
           <a:xfrm>
-            <a:off x="22743000" y="17299800"/>
-            <a:ext cx="15335280" cy="6458040"/>
+            <a:off x="22743000" y="18127800"/>
+            <a:ext cx="15334920" cy="6457680"/>
           </a:xfrm>
           <a:prstGeom prst="rect">
             <a:avLst/>
@@ -4000,8 +4016,8 @@
         </p:nvSpPr>
         <p:spPr>
           <a:xfrm>
-            <a:off x="22743000" y="24010560"/>
-            <a:ext cx="13636080" cy="3335400"/>
+            <a:off x="22743000" y="24442560"/>
+            <a:ext cx="13635720" cy="3335040"/>
           </a:xfrm>
           <a:prstGeom prst="rect">
             <a:avLst/>
@@ -4095,7 +4111,7 @@
         </p:nvSpPr>
         <p:spPr>
           <a:xfrm>
-            <a:off x="1564920" y="4624200"/>
+            <a:off x="1564920" y="4552200"/>
             <a:ext cx="39460320" cy="360"/>
           </a:xfrm>
           <a:prstGeom prst="line">
@@ -4123,7 +4139,7 @@
         </p:nvSpPr>
         <p:spPr>
           <a:xfrm>
-            <a:off x="1671480" y="6640560"/>
+            <a:off x="1671480" y="6820560"/>
             <a:ext cx="39460320" cy="360"/>
           </a:xfrm>
           <a:prstGeom prst="line">
@@ -4151,8 +4167,8 @@
         </p:nvSpPr>
         <p:spPr>
           <a:xfrm>
-            <a:off x="12744000" y="11520000"/>
-            <a:ext cx="9647280" cy="5111280"/>
+            <a:off x="12492000" y="11520000"/>
+            <a:ext cx="9646920" cy="5110920"/>
           </a:xfrm>
           <a:prstGeom prst="rect">
             <a:avLst/>
@@ -4172,7 +4188,7 @@
           <a:bodyPr lIns="90000" rIns="90000" tIns="45000" bIns="45000"/>
           <a:p>
             <a:r>
-              <a:rPr b="0" i="1" lang="en-AU" sz="5400" spc="-1" strike="noStrike">
+              <a:rPr b="0" lang="en-AU" sz="5400" spc="-1" strike="noStrike">
                 <a:solidFill>
                   <a:srgbClr val="000000"/>
                 </a:solidFill>
@@ -4184,7 +4200,7 @@
                 <a:latin typeface="Arial"/>
                 <a:ea typeface="DejaVu Sans"/>
               </a:rPr>
-              <a:t>1. read(byte 0 -&gt; v1) // syscall</a:t>
+              <a:t>01: read(byte 0 -&gt; v1) // syscall</a:t>
             </a:r>
             <a:endParaRPr b="0" lang="en-AU" sz="1800" spc="-1" strike="noStrike">
               <a:solidFill>
@@ -4200,7 +4216,7 @@
           </a:p>
           <a:p>
             <a:r>
-              <a:rPr b="0" i="1" lang="en-AU" sz="5400" spc="-1" strike="noStrike">
+              <a:rPr b="0" lang="en-AU" sz="5400" spc="-1" strike="noStrike">
                 <a:solidFill>
                   <a:srgbClr val="000000"/>
                 </a:solidFill>
@@ -4212,7 +4228,7 @@
                 <a:latin typeface="Arial"/>
                 <a:ea typeface="DejaVu Sans"/>
               </a:rPr>
-              <a:t>2. read(byte 1 -&gt; v2)</a:t>
+              <a:t>02: read(byte 1 -&gt; v2)</a:t>
             </a:r>
             <a:endParaRPr b="0" lang="en-AU" sz="1800" spc="-1" strike="noStrike">
               <a:solidFill>
@@ -4241,7 +4257,7 @@
           </a:p>
           <a:p>
             <a:r>
-              <a:rPr b="0" i="1" lang="en-AU" sz="5400" spc="-1" strike="noStrike">
+              <a:rPr b="0" lang="en-AU" sz="5400" spc="-1" strike="noStrike">
                 <a:solidFill>
                   <a:srgbClr val="000000"/>
                 </a:solidFill>
@@ -4253,7 +4269,7 @@
                 <a:latin typeface="Arial"/>
                 <a:ea typeface="DejaVu Sans"/>
               </a:rPr>
-              <a:t>3. mov rax, v1</a:t>
+              <a:t>03: mov rax, v1</a:t>
             </a:r>
             <a:endParaRPr b="0" lang="en-AU" sz="1800" spc="-1" strike="noStrike">
               <a:solidFill>
@@ -4269,7 +4285,7 @@
           </a:p>
           <a:p>
             <a:r>
-              <a:rPr b="0" i="1" lang="en-AU" sz="5400" spc="-1" strike="noStrike">
+              <a:rPr b="0" lang="en-AU" sz="5400" spc="-1" strike="noStrike">
                 <a:solidFill>
                   <a:srgbClr val="000000"/>
                 </a:solidFill>
@@ -4281,7 +4297,7 @@
                 <a:latin typeface="Arial"/>
                 <a:ea typeface="DejaVu Sans"/>
               </a:rPr>
-              <a:t>4. mov rbx, v2</a:t>
+              <a:t>04: mov rbx, v2</a:t>
             </a:r>
             <a:endParaRPr b="0" lang="en-AU" sz="1800" spc="-1" strike="noStrike">
               <a:solidFill>
@@ -4297,7 +4313,7 @@
           </a:p>
           <a:p>
             <a:r>
-              <a:rPr b="0" i="1" lang="en-AU" sz="5400" spc="-1" strike="noStrike">
+              <a:rPr b="0" lang="en-AU" sz="5400" spc="-1" strike="noStrike">
                 <a:solidFill>
                   <a:srgbClr val="000000"/>
                 </a:solidFill>
@@ -4309,7 +4325,7 @@
                 <a:latin typeface="Arial"/>
                 <a:ea typeface="DejaVu Sans"/>
               </a:rPr>
-              <a:t>5. add rax, rbx</a:t>
+              <a:t>05: add rax, rbx</a:t>
             </a:r>
             <a:endParaRPr b="0" lang="en-AU" sz="1800" spc="-1" strike="noStrike">
               <a:solidFill>
@@ -4325,7 +4341,7 @@
           </a:p>
           <a:p>
             <a:r>
-              <a:rPr b="0" i="1" lang="en-AU" sz="5400" spc="-1" strike="noStrike">
+              <a:rPr b="0" lang="en-AU" sz="5400" spc="-1" strike="noStrike">
                 <a:solidFill>
                   <a:srgbClr val="000000"/>
                 </a:solidFill>
@@ -4337,7 +4353,7 @@
                 <a:latin typeface="Arial"/>
                 <a:ea typeface="DejaVu Sans"/>
               </a:rPr>
-              <a:t>6. mov v1, rax</a:t>
+              <a:t>06: mov v1, rax</a:t>
             </a:r>
             <a:endParaRPr b="0" lang="en-AU" sz="1800" spc="-1" strike="noStrike">
               <a:solidFill>
@@ -4362,13 +4378,15 @@
         <p:spPr>
           <a:xfrm>
             <a:off x="16265880" y="17464680"/>
-            <a:ext cx="1688040" cy="1631520"/>
+            <a:ext cx="1687680" cy="1631160"/>
           </a:xfrm>
           <a:prstGeom prst="rect">
             <a:avLst/>
           </a:prstGeom>
           <a:solidFill>
-            <a:srgbClr val="ffffff"/>
+            <a:srgbClr val="ff0000">
+              <a:alpha val="50000"/>
+            </a:srgbClr>
           </a:solidFill>
           <a:ln>
             <a:solidFill>
@@ -4428,13 +4446,15 @@
         <p:spPr>
           <a:xfrm>
             <a:off x="17996760" y="17464680"/>
-            <a:ext cx="1688040" cy="1631520"/>
+            <a:ext cx="1687680" cy="1631160"/>
           </a:xfrm>
           <a:prstGeom prst="rect">
             <a:avLst/>
           </a:prstGeom>
           <a:solidFill>
-            <a:srgbClr val="ffffff"/>
+            <a:srgbClr val="ff0000">
+              <a:alpha val="50000"/>
+            </a:srgbClr>
           </a:solidFill>
           <a:ln>
             <a:solidFill>
@@ -4494,13 +4514,13 @@
         <p:spPr>
           <a:xfrm>
             <a:off x="16265880" y="20752920"/>
-            <a:ext cx="1688040" cy="1631520"/>
+            <a:ext cx="1687680" cy="1631160"/>
           </a:xfrm>
           <a:prstGeom prst="rect">
             <a:avLst/>
           </a:prstGeom>
           <a:solidFill>
-            <a:srgbClr val="ffffff"/>
+            <a:srgbClr val="ff9900"/>
           </a:solidFill>
           <a:ln>
             <a:solidFill>
@@ -4560,13 +4580,13 @@
         <p:spPr>
           <a:xfrm>
             <a:off x="17996760" y="20752920"/>
-            <a:ext cx="1688040" cy="1631520"/>
+            <a:ext cx="1687680" cy="1631160"/>
           </a:xfrm>
           <a:prstGeom prst="rect">
             <a:avLst/>
           </a:prstGeom>
           <a:solidFill>
-            <a:srgbClr val="ffffff"/>
+            <a:srgbClr val="ff9900"/>
           </a:solidFill>
           <a:ln>
             <a:solidFill>
@@ -4626,13 +4646,13 @@
         <p:spPr>
           <a:xfrm>
             <a:off x="16265880" y="23918040"/>
-            <a:ext cx="1688040" cy="1631520"/>
+            <a:ext cx="1687680" cy="1631160"/>
           </a:xfrm>
           <a:prstGeom prst="rect">
             <a:avLst/>
           </a:prstGeom>
           <a:solidFill>
-            <a:srgbClr val="ffffff"/>
+            <a:srgbClr val="66cc00"/>
           </a:solidFill>
           <a:ln>
             <a:solidFill>
@@ -4692,13 +4712,13 @@
         <p:spPr>
           <a:xfrm>
             <a:off x="17996760" y="23918040"/>
-            <a:ext cx="1688040" cy="1631520"/>
+            <a:ext cx="1687680" cy="1631160"/>
           </a:xfrm>
           <a:prstGeom prst="rect">
             <a:avLst/>
           </a:prstGeom>
           <a:solidFill>
-            <a:srgbClr val="ffffff"/>
+            <a:srgbClr val="66cc00"/>
           </a:solidFill>
           <a:ln>
             <a:solidFill>
@@ -4758,7 +4778,7 @@
         <p:spPr>
           <a:xfrm>
             <a:off x="14577480" y="17916840"/>
-            <a:ext cx="1265760" cy="683640"/>
+            <a:ext cx="1265400" cy="683280"/>
           </a:xfrm>
           <a:prstGeom prst="rect">
             <a:avLst/>
@@ -4815,7 +4835,7 @@
         <p:spPr>
           <a:xfrm>
             <a:off x="14070960" y="21166560"/>
-            <a:ext cx="2278800" cy="683640"/>
+            <a:ext cx="2278440" cy="683280"/>
           </a:xfrm>
           <a:prstGeom prst="rect">
             <a:avLst/>
@@ -4872,7 +4892,7 @@
         <p:spPr>
           <a:xfrm>
             <a:off x="13817520" y="24373080"/>
-            <a:ext cx="2532240" cy="765360"/>
+            <a:ext cx="2531880" cy="765000"/>
           </a:xfrm>
           <a:prstGeom prst="rect">
             <a:avLst/>
@@ -5131,7 +5151,7 @@
         <p:spPr>
           <a:xfrm>
             <a:off x="16603920" y="19467000"/>
-            <a:ext cx="758880" cy="617400"/>
+            <a:ext cx="758520" cy="617040"/>
           </a:xfrm>
           <a:prstGeom prst="rect">
             <a:avLst/>
@@ -5188,7 +5208,7 @@
         <p:spPr>
           <a:xfrm>
             <a:off x="18123480" y="19467000"/>
-            <a:ext cx="759240" cy="617400"/>
+            <a:ext cx="758880" cy="617040"/>
           </a:xfrm>
           <a:prstGeom prst="rect">
             <a:avLst/>
@@ -5245,7 +5265,7 @@
         <p:spPr>
           <a:xfrm>
             <a:off x="17237160" y="22713840"/>
-            <a:ext cx="758880" cy="617760"/>
+            <a:ext cx="758520" cy="617400"/>
           </a:xfrm>
           <a:prstGeom prst="rect">
             <a:avLst/>
@@ -5302,7 +5322,7 @@
         <p:spPr>
           <a:xfrm>
             <a:off x="18841320" y="22713840"/>
-            <a:ext cx="758880" cy="617760"/>
+            <a:ext cx="758520" cy="617400"/>
           </a:xfrm>
           <a:prstGeom prst="rect">
             <a:avLst/>
@@ -5359,7 +5379,7 @@
         <p:spPr>
           <a:xfrm>
             <a:off x="17743680" y="25837920"/>
-            <a:ext cx="759240" cy="617400"/>
+            <a:ext cx="758880" cy="617040"/>
           </a:xfrm>
           <a:prstGeom prst="rect">
             <a:avLst/>
@@ -5416,7 +5436,7 @@
         <p:spPr>
           <a:xfrm>
             <a:off x="15928200" y="23042880"/>
-            <a:ext cx="759240" cy="617400"/>
+            <a:ext cx="758880" cy="617040"/>
           </a:xfrm>
           <a:prstGeom prst="rect">
             <a:avLst/>
@@ -5472,8 +5492,8 @@
         </p:nvSpPr>
         <p:spPr>
           <a:xfrm>
-            <a:off x="12528000" y="11376000"/>
-            <a:ext cx="9503280" cy="5616000"/>
+            <a:off x="12240000" y="11376000"/>
+            <a:ext cx="9898920" cy="5615640"/>
           </a:xfrm>
           <a:prstGeom prst="rect">
             <a:avLst/>
@@ -5501,7 +5521,7 @@
         <p:spPr>
           <a:xfrm>
             <a:off x="12672000" y="10208520"/>
-            <a:ext cx="9359280" cy="878760"/>
+            <a:ext cx="9358920" cy="878400"/>
           </a:xfrm>
           <a:prstGeom prst="rect">
             <a:avLst/>

</xml_diff>